<commit_message>
modified retex web & added new one
</commit_message>
<xml_diff>
--- a/sae_retex/StaticWebApp.pptx
+++ b/sae_retex/StaticWebApp.pptx
@@ -3860,19 +3860,11 @@
             </a:pPr>
             <a:r>
               <a:rPr lang="fr-FR" b="1" dirty="0" smtClean="0"/>
-              <a:t>&gt; </a:t>
-            </a:r>
-            <a:r>
-              <a:rPr lang="fr-FR" b="1" dirty="0" smtClean="0"/>
-              <a:t> </a:t>
+              <a:t>&gt;  </a:t>
             </a:r>
             <a:r>
               <a:rPr lang="fr-FR" b="0" dirty="0" smtClean="0"/>
-              <a:t>Travail </a:t>
-            </a:r>
-            <a:r>
-              <a:rPr lang="fr-FR" b="0" dirty="0" smtClean="0"/>
-              <a:t>en équipe (avec</a:t>
+              <a:t>Travail en équipe (avec</a:t>
             </a:r>
             <a:r>
               <a:rPr lang="fr-FR" b="0" baseline="0" dirty="0" smtClean="0"/>
@@ -3898,19 +3890,11 @@
             </a:r>
             <a:r>
               <a:rPr lang="fr-FR" b="0" dirty="0" smtClean="0"/>
-              <a:t> </a:t>
-            </a:r>
-            <a:r>
-              <a:rPr lang="fr-FR" b="0" dirty="0" smtClean="0"/>
-              <a:t> Créer</a:t>
+              <a:t>  Créer</a:t>
             </a:r>
             <a:r>
               <a:rPr lang="fr-FR" b="0" baseline="0" dirty="0" smtClean="0"/>
-              <a:t> </a:t>
-            </a:r>
-            <a:r>
-              <a:rPr lang="fr-FR" b="0" baseline="0" dirty="0" smtClean="0"/>
-              <a:t>un site web responsive présentant notre entreprise fictive</a:t>
+              <a:t> un site web responsive présentant notre entreprise fictive</a:t>
             </a:r>
           </a:p>
           <a:p>
@@ -3927,19 +3911,11 @@
             </a:r>
             <a:r>
               <a:rPr lang="fr-FR" b="1" baseline="0" dirty="0" smtClean="0"/>
-              <a:t> </a:t>
-            </a:r>
-            <a:r>
-              <a:rPr lang="fr-FR" b="1" baseline="0" dirty="0" smtClean="0"/>
-              <a:t> </a:t>
+              <a:t>  </a:t>
             </a:r>
             <a:r>
               <a:rPr lang="fr-FR" b="0" baseline="0" dirty="0" smtClean="0"/>
-              <a:t>Site </a:t>
-            </a:r>
-            <a:r>
-              <a:rPr lang="fr-FR" b="0" baseline="0" dirty="0" smtClean="0"/>
-              <a:t>web statique uniquement, sans JavaScript ou </a:t>
+              <a:t>Site web statique uniquement, sans JavaScript ou </a:t>
             </a:r>
             <a:r>
               <a:rPr lang="fr-FR" b="0" baseline="0" dirty="0" err="1" smtClean="0"/>
@@ -4031,11 +4007,7 @@
           <a:p>
             <a:r>
               <a:rPr lang="fr-FR" sz="1600" baseline="0" dirty="0" smtClean="0"/>
-              <a:t>             HTML/CSS ainsi que de la </a:t>
-            </a:r>
-            <a:r>
-              <a:rPr lang="fr-FR" sz="1600" baseline="0" dirty="0" smtClean="0"/>
-              <a:t>« responsive-</a:t>
+              <a:t>             HTML/CSS ainsi que de la « responsive-</a:t>
             </a:r>
             <a:r>
               <a:rPr lang="fr-FR" sz="1600" baseline="0" dirty="0" err="1" smtClean="0"/>
@@ -4045,7 +4017,6 @@
               <a:rPr lang="fr-FR" sz="1600" baseline="0" dirty="0" smtClean="0"/>
               <a:t> » d’un site</a:t>
             </a:r>
-            <a:endParaRPr lang="fr-FR" sz="1600" baseline="0" dirty="0" smtClean="0"/>
           </a:p>
           <a:p>
             <a:endParaRPr lang="fr-FR" sz="1600" baseline="0" dirty="0" smtClean="0"/>
@@ -4199,8 +4170,8 @@
         </p:nvSpPr>
         <p:spPr>
           <a:xfrm>
-            <a:off x="4334200" y="4011241"/>
-            <a:ext cx="1544143" cy="1754326"/>
+            <a:off x="4305119" y="3942501"/>
+            <a:ext cx="1544143" cy="2031325"/>
           </a:xfrm>
           <a:prstGeom prst="rect">
             <a:avLst/>
@@ -4215,7 +4186,11 @@
           <a:p>
             <a:r>
               <a:rPr lang="fr-FR" dirty="0" smtClean="0"/>
-              <a:t>Les images</a:t>
+              <a:t>Les deux </a:t>
+            </a:r>
+            <a:r>
+              <a:rPr lang="fr-FR" dirty="0" smtClean="0"/>
+              <a:t>images</a:t>
             </a:r>
             <a:r>
               <a:rPr lang="fr-FR" baseline="0" dirty="0" smtClean="0"/>

</xml_diff>